<commit_message>
Updates for latest version from Darmstadt, Feb 2017
</commit_message>
<xml_diff>
--- a/undergraduate/labs/kernel-services.pptx
+++ b/undergraduate/labs/kernel-services.pptx
@@ -5,13 +5,19 @@
     <p:sldMasterId id="2147483786" r:id="rId1"/>
   </p:sldMasterIdLst>
   <p:notesMasterIdLst>
-    <p:notesMasterId r:id="rId6"/>
+    <p:notesMasterId r:id="rId12"/>
   </p:notesMasterIdLst>
   <p:sldIdLst>
     <p:sldId id="261" r:id="rId2"/>
     <p:sldId id="258" r:id="rId3"/>
-    <p:sldId id="259" r:id="rId4"/>
-    <p:sldId id="260" r:id="rId5"/>
+    <p:sldId id="262" r:id="rId4"/>
+    <p:sldId id="263" r:id="rId5"/>
+    <p:sldId id="264" r:id="rId6"/>
+    <p:sldId id="259" r:id="rId7"/>
+    <p:sldId id="265" r:id="rId8"/>
+    <p:sldId id="266" r:id="rId9"/>
+    <p:sldId id="267" r:id="rId10"/>
+    <p:sldId id="260" r:id="rId11"/>
   </p:sldIdLst>
   <p:sldSz cx="12192000" cy="6858000"/>
   <p:notesSz cx="6858000" cy="9144000"/>
@@ -4402,12 +4408,8 @@
               <a:rPr lang="en-US" dirty="0" smtClean="0"/>
             </a:br>
             <a:r>
-              <a:rPr lang="en-US" dirty="0" err="1" smtClean="0"/>
-              <a:t>DTrace</a:t>
-            </a:r>
-            <a:r>
-              <a:rPr lang="en-US" smtClean="0"/>
-              <a:t> Lab</a:t>
+              <a:rPr lang="en-US" dirty="0" smtClean="0"/>
+              <a:t>Kernel Services Lab</a:t>
             </a:r>
             <a:endParaRPr lang="en-US" dirty="0"/>
           </a:p>
@@ -4439,6 +4441,260 @@
     <p:extLst>
       <p:ext uri="{BB962C8B-B14F-4D97-AF65-F5344CB8AC3E}">
         <p14:creationId xmlns:p14="http://schemas.microsoft.com/office/powerpoint/2010/main" val="1338276881"/>
+      </p:ext>
+    </p:extLst>
+  </p:cSld>
+  <p:clrMapOvr>
+    <a:masterClrMapping/>
+  </p:clrMapOvr>
+</p:sld>
+</file>
+
+<file path=ppt/slides/slide10.xml><?xml version="1.0" encoding="utf-8"?>
+<p:sld xmlns:a="http://schemas.openxmlformats.org/drawingml/2006/main" xmlns:r="http://schemas.openxmlformats.org/officeDocument/2006/relationships" xmlns:p="http://schemas.openxmlformats.org/presentationml/2006/main">
+  <p:cSld>
+    <p:spTree>
+      <p:nvGrpSpPr>
+        <p:cNvPr id="1" name=""/>
+        <p:cNvGrpSpPr/>
+        <p:nvPr/>
+      </p:nvGrpSpPr>
+      <p:grpSpPr>
+        <a:xfrm>
+          <a:off x="0" y="0"/>
+          <a:ext cx="0" cy="0"/>
+          <a:chOff x="0" y="0"/>
+          <a:chExt cx="0" cy="0"/>
+        </a:xfrm>
+      </p:grpSpPr>
+      <p:sp>
+        <p:nvSpPr>
+          <p:cNvPr id="2" name="Title 1"/>
+          <p:cNvSpPr>
+            <a:spLocks noGrp="1"/>
+          </p:cNvSpPr>
+          <p:nvPr>
+            <p:ph type="title"/>
+          </p:nvPr>
+        </p:nvSpPr>
+        <p:spPr/>
+        <p:txBody>
+          <a:bodyPr/>
+          <a:lstStyle/>
+          <a:p>
+            <a:r>
+              <a:rPr lang="en-US" dirty="0" smtClean="0"/>
+              <a:t>Kernel Services Lab Exercises</a:t>
+            </a:r>
+            <a:endParaRPr lang="en-US" dirty="0"/>
+          </a:p>
+        </p:txBody>
+      </p:sp>
+      <p:sp>
+        <p:nvSpPr>
+          <p:cNvPr id="3" name="Content Placeholder 2"/>
+          <p:cNvSpPr>
+            <a:spLocks noGrp="1"/>
+          </p:cNvSpPr>
+          <p:nvPr>
+            <p:ph idx="1"/>
+          </p:nvPr>
+        </p:nvSpPr>
+        <p:spPr/>
+        <p:txBody>
+          <a:bodyPr/>
+          <a:lstStyle/>
+          <a:p>
+            <a:r>
+              <a:rPr lang="en-US" dirty="0" smtClean="0"/>
+              <a:t>Find </a:t>
+            </a:r>
+            <a:r>
+              <a:rPr lang="en-US" dirty="0"/>
+              <a:t>the </a:t>
+            </a:r>
+            <a:r>
+              <a:rPr lang="en-US" dirty="0" smtClean="0"/>
+              <a:t>list </a:t>
+            </a:r>
+            <a:r>
+              <a:rPr lang="en-US" dirty="0"/>
+              <a:t>of </a:t>
+            </a:r>
+            <a:r>
+              <a:rPr lang="en-US" dirty="0" smtClean="0"/>
+              <a:t>providers</a:t>
+            </a:r>
+          </a:p>
+          <a:p>
+            <a:r>
+              <a:rPr lang="en-US" dirty="0" smtClean="0"/>
+              <a:t>Count </a:t>
+            </a:r>
+            <a:r>
+              <a:rPr lang="en-US" dirty="0"/>
+              <a:t>the probes </a:t>
+            </a:r>
+            <a:r>
+              <a:rPr lang="en-US" dirty="0" smtClean="0"/>
+              <a:t>available in the </a:t>
+            </a:r>
+            <a:r>
+              <a:rPr lang="en-US" dirty="0" err="1" smtClean="0"/>
+              <a:t>syscall</a:t>
+            </a:r>
+            <a:r>
+              <a:rPr lang="en-US" dirty="0" smtClean="0"/>
+              <a:t> provider</a:t>
+            </a:r>
+          </a:p>
+          <a:p>
+            <a:r>
+              <a:rPr lang="en-US" dirty="0" smtClean="0"/>
+              <a:t>Count the probes available in the </a:t>
+            </a:r>
+            <a:r>
+              <a:rPr lang="en-US" dirty="0" err="1" smtClean="0"/>
+              <a:t>fbt</a:t>
+            </a:r>
+            <a:r>
+              <a:rPr lang="en-US" dirty="0" smtClean="0"/>
+              <a:t> provider</a:t>
+            </a:r>
+          </a:p>
+          <a:p>
+            <a:r>
+              <a:rPr lang="en-US" dirty="0" smtClean="0"/>
+              <a:t>Find </a:t>
+            </a:r>
+            <a:r>
+              <a:rPr lang="en-US" dirty="0"/>
+              <a:t>and modify three (3) of the </a:t>
+            </a:r>
+            <a:r>
+              <a:rPr lang="en-US" dirty="0" err="1"/>
+              <a:t>DTrace</a:t>
+            </a:r>
+            <a:r>
+              <a:rPr lang="en-US" dirty="0"/>
+              <a:t> </a:t>
+            </a:r>
+            <a:r>
+              <a:rPr lang="en-US" dirty="0" smtClean="0"/>
+              <a:t>one-liners</a:t>
+            </a:r>
+          </a:p>
+          <a:p>
+            <a:r>
+              <a:rPr lang="en-US" dirty="0" smtClean="0"/>
+              <a:t>List one program that is asking for the time of day.</a:t>
+            </a:r>
+          </a:p>
+          <a:p>
+            <a:r>
+              <a:rPr lang="en-US" dirty="0" smtClean="0"/>
+              <a:t>Show that </a:t>
+            </a:r>
+            <a:r>
+              <a:rPr lang="en-US" dirty="0" err="1" smtClean="0"/>
+              <a:t>ntpdate</a:t>
+            </a:r>
+            <a:r>
+              <a:rPr lang="en-US" dirty="0" smtClean="0"/>
+              <a:t> sets the kernel time</a:t>
+            </a:r>
+          </a:p>
+          <a:p>
+            <a:pPr lvl="1"/>
+            <a:r>
+              <a:rPr lang="en-US" dirty="0" err="1" smtClean="0"/>
+              <a:t>ntpdate</a:t>
+            </a:r>
+            <a:r>
+              <a:rPr lang="en-US" dirty="0" smtClean="0"/>
+              <a:t> </a:t>
+            </a:r>
+            <a:r>
+              <a:rPr lang="en-US" smtClean="0"/>
+              <a:t>time.apple.com</a:t>
+            </a:r>
+            <a:endParaRPr lang="en-US" dirty="0" smtClean="0"/>
+          </a:p>
+        </p:txBody>
+      </p:sp>
+      <p:sp>
+        <p:nvSpPr>
+          <p:cNvPr id="4" name="Date Placeholder 3"/>
+          <p:cNvSpPr>
+            <a:spLocks noGrp="1"/>
+          </p:cNvSpPr>
+          <p:nvPr>
+            <p:ph type="dt" sz="half" idx="10"/>
+          </p:nvPr>
+        </p:nvSpPr>
+        <p:spPr/>
+        <p:txBody>
+          <a:bodyPr/>
+          <a:lstStyle/>
+          <a:p>
+            <a:fld id="{BC4AE5AA-C6FF-5A4F-9D02-E3454F0B3602}" type="datetime1">
+              <a:rPr lang="en-US" smtClean="0"/>
+              <a:t>2/20/17</a:t>
+            </a:fld>
+            <a:endParaRPr lang="en-US"/>
+          </a:p>
+        </p:txBody>
+      </p:sp>
+      <p:sp>
+        <p:nvSpPr>
+          <p:cNvPr id="5" name="Footer Placeholder 4"/>
+          <p:cNvSpPr>
+            <a:spLocks noGrp="1"/>
+          </p:cNvSpPr>
+          <p:nvPr>
+            <p:ph type="ftr" sz="quarter" idx="11"/>
+          </p:nvPr>
+        </p:nvSpPr>
+        <p:spPr/>
+        <p:txBody>
+          <a:bodyPr/>
+          <a:lstStyle/>
+          <a:p>
+            <a:r>
+              <a:rPr lang="en-US" smtClean="0"/>
+              <a:t>Developing Products with FreeBSD</a:t>
+            </a:r>
+            <a:endParaRPr lang="en-US" dirty="0"/>
+          </a:p>
+        </p:txBody>
+      </p:sp>
+      <p:sp>
+        <p:nvSpPr>
+          <p:cNvPr id="6" name="Slide Number Placeholder 5"/>
+          <p:cNvSpPr>
+            <a:spLocks noGrp="1"/>
+          </p:cNvSpPr>
+          <p:nvPr>
+            <p:ph type="sldNum" sz="quarter" idx="12"/>
+          </p:nvPr>
+        </p:nvSpPr>
+        <p:spPr/>
+        <p:txBody>
+          <a:bodyPr/>
+          <a:lstStyle/>
+          <a:p>
+            <a:fld id="{699C44C4-0FAD-8046-A5C4-05AB318FA424}" type="slidenum">
+              <a:rPr lang="en-US" smtClean="0"/>
+              <a:t>10</a:t>
+            </a:fld>
+            <a:endParaRPr lang="en-US"/>
+          </a:p>
+        </p:txBody>
+      </p:sp>
+    </p:spTree>
+    <p:extLst>
+      <p:ext uri="{BB962C8B-B14F-4D97-AF65-F5344CB8AC3E}">
+        <p14:creationId xmlns:p14="http://schemas.microsoft.com/office/powerpoint/2010/main" val="255175042"/>
       </p:ext>
     </p:extLst>
   </p:cSld>
@@ -4541,7 +4797,6 @@
               <a:rPr lang="en-US" dirty="0" smtClean="0"/>
               <a:t>(no password) </a:t>
             </a:r>
-            <a:endParaRPr lang="en-US" dirty="0" smtClean="0"/>
           </a:p>
           <a:p>
             <a:r>
@@ -4717,12 +4972,16 @@
           <a:p>
             <a:r>
               <a:rPr lang="en-US" dirty="0" smtClean="0"/>
-              <a:t>Trying </a:t>
+              <a:t>What is </a:t>
             </a:r>
             <a:r>
               <a:rPr lang="en-US" dirty="0" err="1" smtClean="0"/>
               <a:t>DTrace</a:t>
             </a:r>
+            <a:r>
+              <a:rPr lang="en-US" dirty="0" smtClean="0"/>
+              <a:t>?</a:t>
+            </a:r>
             <a:endParaRPr lang="en-US" dirty="0"/>
           </a:p>
         </p:txBody>
@@ -4743,136 +5002,46 @@
           <a:lstStyle/>
           <a:p>
             <a:r>
+              <a:rPr lang="en-US" dirty="0" smtClean="0"/>
+              <a:t>A </a:t>
+            </a:r>
+            <a:r>
               <a:rPr lang="en-US" dirty="0"/>
-              <a:t> </a:t>
-            </a:r>
-            <a:r>
-              <a:rPr lang="en-US" dirty="0" smtClean="0"/>
-              <a:t> </a:t>
+              <a:t>dynamic tracing framework for software </a:t>
+            </a:r>
+            <a:endParaRPr lang="en-US" dirty="0" smtClean="0"/>
+          </a:p>
+          <a:p>
+            <a:r>
+              <a:rPr lang="en-US" dirty="0" smtClean="0"/>
+              <a:t>Low </a:t>
             </a:r>
             <a:r>
               <a:rPr lang="en-US" dirty="0"/>
-              <a:t>Count system </a:t>
-            </a:r>
-            <a:r>
-              <a:rPr lang="en-US" dirty="0" smtClean="0"/>
-              <a:t>calls</a:t>
-            </a:r>
-          </a:p>
-          <a:p>
-            <a:pPr lvl="1"/>
-            <a:r>
-              <a:rPr lang="en-US" dirty="0" err="1" smtClean="0"/>
-              <a:t>dtrace</a:t>
-            </a:r>
-            <a:r>
-              <a:rPr lang="en-US" dirty="0" smtClean="0"/>
-              <a:t> -l </a:t>
+              <a:t>impact on overall system performance </a:t>
+            </a:r>
+            <a:endParaRPr lang="en-US" dirty="0" smtClean="0"/>
+          </a:p>
+          <a:p>
+            <a:r>
+              <a:rPr lang="en-US" dirty="0" smtClean="0"/>
+              <a:t>Does </a:t>
             </a:r>
             <a:r>
               <a:rPr lang="en-US" dirty="0"/>
-              <a:t>-P </a:t>
-            </a:r>
-            <a:r>
-              <a:rPr lang="en-US" dirty="0" err="1"/>
-              <a:t>syscall</a:t>
-            </a:r>
-            <a:r>
-              <a:rPr lang="en-US" dirty="0"/>
-              <a:t> | </a:t>
-            </a:r>
-            <a:r>
-              <a:rPr lang="en-US" dirty="0" err="1"/>
-              <a:t>wc</a:t>
-            </a:r>
-            <a:r>
-              <a:rPr lang="en-US" dirty="0"/>
-              <a:t> </a:t>
-            </a:r>
-            <a:r>
-              <a:rPr lang="en-US" dirty="0" smtClean="0"/>
-              <a:t>-l</a:t>
-            </a:r>
-            <a:endParaRPr lang="en-US" dirty="0" smtClean="0"/>
-          </a:p>
-          <a:p>
-            <a:pPr lvl="1"/>
-            <a:r>
-              <a:rPr lang="en-US" dirty="0" smtClean="0"/>
-              <a:t>Is this the true count?</a:t>
-            </a:r>
-          </a:p>
-          <a:p>
-            <a:r>
-              <a:rPr lang="en-US" dirty="0" smtClean="0"/>
-              <a:t>Trace </a:t>
-            </a:r>
-            <a:r>
-              <a:rPr lang="en-US" dirty="0"/>
-              <a:t>the names of files </a:t>
-            </a:r>
-            <a:r>
-              <a:rPr lang="en-US" dirty="0" smtClean="0"/>
-              <a:t>opened</a:t>
-            </a:r>
-          </a:p>
-          <a:p>
-            <a:pPr lvl="1"/>
-            <a:r>
-              <a:rPr lang="en-US" dirty="0" err="1" smtClean="0"/>
-              <a:t>dtrace</a:t>
-            </a:r>
-            <a:r>
-              <a:rPr lang="en-US" dirty="0" smtClean="0"/>
-              <a:t> </a:t>
-            </a:r>
-            <a:r>
-              <a:rPr lang="en-US" dirty="0"/>
-              <a:t>-n '</a:t>
-            </a:r>
-            <a:r>
-              <a:rPr lang="en-US" dirty="0" err="1"/>
-              <a:t>syscall</a:t>
-            </a:r>
-            <a:r>
-              <a:rPr lang="en-US" dirty="0"/>
-              <a:t>::</a:t>
-            </a:r>
-            <a:r>
-              <a:rPr lang="en-US" dirty="0" err="1" smtClean="0"/>
-              <a:t>open:entry</a:t>
-            </a:r>
-            <a:r>
-              <a:rPr lang="en-US" dirty="0" smtClean="0"/>
-              <a:t> { </a:t>
-            </a:r>
-            <a:r>
-              <a:rPr lang="en-US" dirty="0" err="1"/>
-              <a:t>printf</a:t>
-            </a:r>
-            <a:r>
-              <a:rPr lang="en-US" dirty="0"/>
-              <a:t>("%s", </a:t>
-            </a:r>
-            <a:r>
-              <a:rPr lang="en-US" dirty="0" err="1"/>
-              <a:t>copyinstr</a:t>
-            </a:r>
-            <a:r>
-              <a:rPr lang="en-US" dirty="0"/>
-              <a:t>(arg0)); }'</a:t>
-            </a:r>
-          </a:p>
-        </p:txBody>
-      </p:sp>
-      <p:sp>
-        <p:nvSpPr>
-          <p:cNvPr id="4" name="Date Placeholder 3"/>
-          <p:cNvSpPr>
-            <a:spLocks noGrp="1"/>
-          </p:cNvSpPr>
-          <p:nvPr>
-            <p:ph type="dt" sz="half" idx="10"/>
+              <a:t>not incur costs when not in use</a:t>
+            </a:r>
+          </a:p>
+        </p:txBody>
+      </p:sp>
+      <p:sp>
+        <p:nvSpPr>
+          <p:cNvPr id="4" name="Footer Placeholder 3"/>
+          <p:cNvSpPr>
+            <a:spLocks noGrp="1"/>
+          </p:cNvSpPr>
+          <p:nvPr>
+            <p:ph type="ftr" sz="quarter" idx="11"/>
           </p:nvPr>
         </p:nvSpPr>
         <p:spPr/>
@@ -4880,70 +5049,31 @@
           <a:bodyPr/>
           <a:lstStyle/>
           <a:p>
-            <a:fld id="{BC4AE5AA-C6FF-5A4F-9D02-E3454F0B3602}" type="datetime1">
-              <a:rPr lang="en-US" smtClean="0"/>
-              <a:t>2/20/17</a:t>
-            </a:fld>
-            <a:endParaRPr lang="en-US"/>
-          </a:p>
-        </p:txBody>
-      </p:sp>
-      <p:sp>
-        <p:nvSpPr>
-          <p:cNvPr id="5" name="Footer Placeholder 4"/>
-          <p:cNvSpPr>
-            <a:spLocks noGrp="1"/>
-          </p:cNvSpPr>
-          <p:nvPr>
-            <p:ph type="ftr" sz="quarter" idx="11"/>
-          </p:nvPr>
-        </p:nvSpPr>
-        <p:spPr/>
-        <p:txBody>
-          <a:bodyPr/>
-          <a:lstStyle/>
-          <a:p>
-            <a:r>
-              <a:rPr lang="en-US" smtClean="0"/>
-              <a:t>Developing Products with FreeBSD</a:t>
+            <a:r>
+              <a:rPr lang="en-US" smtClean="0"/>
+              <a:t>Introduction to Operating Systems</a:t>
             </a:r>
             <a:endParaRPr lang="en-US" dirty="0"/>
-          </a:p>
-        </p:txBody>
-      </p:sp>
-      <p:sp>
-        <p:nvSpPr>
-          <p:cNvPr id="6" name="Slide Number Placeholder 5"/>
-          <p:cNvSpPr>
-            <a:spLocks noGrp="1"/>
-          </p:cNvSpPr>
-          <p:nvPr>
-            <p:ph type="sldNum" sz="quarter" idx="12"/>
-          </p:nvPr>
-        </p:nvSpPr>
-        <p:spPr/>
-        <p:txBody>
-          <a:bodyPr/>
-          <a:lstStyle/>
-          <a:p>
-            <a:fld id="{699C44C4-0FAD-8046-A5C4-05AB318FA424}" type="slidenum">
-              <a:rPr lang="en-US" smtClean="0"/>
-              <a:t>3</a:t>
-            </a:fld>
-            <a:endParaRPr lang="en-US"/>
           </a:p>
         </p:txBody>
       </p:sp>
     </p:spTree>
     <p:extLst>
       <p:ext uri="{BB962C8B-B14F-4D97-AF65-F5344CB8AC3E}">
-        <p14:creationId xmlns:p14="http://schemas.microsoft.com/office/powerpoint/2010/main" val="1899540757"/>
+        <p14:creationId xmlns:p14="http://schemas.microsoft.com/office/powerpoint/2010/main" val="166840241"/>
       </p:ext>
     </p:extLst>
   </p:cSld>
   <p:clrMapOvr>
     <a:masterClrMapping/>
   </p:clrMapOvr>
+  <p:timing>
+    <p:tnLst>
+      <p:par>
+        <p:cTn id="1" dur="indefinite" restart="never" nodeType="tmRoot"/>
+      </p:par>
+    </p:tnLst>
+  </p:timing>
 </p:sld>
 </file>
 
@@ -4981,11 +5111,15 @@
           <a:p>
             <a:r>
               <a:rPr lang="en-US" dirty="0" smtClean="0"/>
-              <a:t>Kernel Services Lab </a:t>
-            </a:r>
-            <a:r>
-              <a:rPr lang="en-US" dirty="0" smtClean="0"/>
-              <a:t>Exercises</a:t>
+              <a:t>What can </a:t>
+            </a:r>
+            <a:r>
+              <a:rPr lang="en-US" dirty="0" err="1" smtClean="0"/>
+              <a:t>DTrace</a:t>
+            </a:r>
+            <a:r>
+              <a:rPr lang="en-US" dirty="0" smtClean="0"/>
+              <a:t> show me?</a:t>
             </a:r>
             <a:endParaRPr lang="en-US" dirty="0"/>
           </a:p>
@@ -5008,119 +5142,354 @@
           <a:p>
             <a:r>
               <a:rPr lang="en-US" dirty="0" smtClean="0"/>
-              <a:t>Find </a:t>
+              <a:t>When </a:t>
             </a:r>
             <a:r>
               <a:rPr lang="en-US" dirty="0"/>
-              <a:t>the </a:t>
-            </a:r>
-            <a:r>
-              <a:rPr lang="en-US" dirty="0" smtClean="0"/>
-              <a:t>list </a:t>
+              <a:t>a function is being called </a:t>
+            </a:r>
+            <a:endParaRPr lang="en-US" dirty="0" smtClean="0"/>
+          </a:p>
+          <a:p>
+            <a:r>
+              <a:rPr lang="en-US" dirty="0" smtClean="0"/>
+              <a:t>A </a:t>
             </a:r>
             <a:r>
               <a:rPr lang="en-US" dirty="0"/>
-              <a:t>of </a:t>
-            </a:r>
-            <a:r>
-              <a:rPr lang="en-US" dirty="0" smtClean="0"/>
-              <a:t>providers</a:t>
-            </a:r>
-          </a:p>
-          <a:p>
-            <a:r>
-              <a:rPr lang="en-US" dirty="0" smtClean="0"/>
-              <a:t>Count </a:t>
+              <a:t>function’s arguments</a:t>
+            </a:r>
+          </a:p>
+          <a:p>
+            <a:r>
+              <a:rPr lang="en-US" dirty="0" smtClean="0"/>
+              <a:t>The </a:t>
             </a:r>
             <a:r>
               <a:rPr lang="en-US" dirty="0"/>
-              <a:t>the probes </a:t>
-            </a:r>
-            <a:r>
-              <a:rPr lang="en-US" dirty="0" smtClean="0"/>
-              <a:t>available in the </a:t>
+              <a:t>frequency of function calls </a:t>
+            </a:r>
+            <a:endParaRPr lang="en-US" dirty="0" smtClean="0"/>
+          </a:p>
+          <a:p>
+            <a:r>
+              <a:rPr lang="en-US" dirty="0" smtClean="0"/>
+              <a:t>A </a:t>
+            </a:r>
+            <a:r>
+              <a:rPr lang="en-US" dirty="0"/>
+              <a:t>whole lot more...</a:t>
+            </a:r>
+          </a:p>
+          <a:p>
+            <a:endParaRPr lang="en-US" dirty="0"/>
+          </a:p>
+        </p:txBody>
+      </p:sp>
+      <p:sp>
+        <p:nvSpPr>
+          <p:cNvPr id="4" name="Footer Placeholder 3"/>
+          <p:cNvSpPr>
+            <a:spLocks noGrp="1"/>
+          </p:cNvSpPr>
+          <p:nvPr>
+            <p:ph type="ftr" sz="quarter" idx="11"/>
+          </p:nvPr>
+        </p:nvSpPr>
+        <p:spPr/>
+        <p:txBody>
+          <a:bodyPr/>
+          <a:lstStyle/>
+          <a:p>
+            <a:r>
+              <a:rPr lang="en-US" smtClean="0"/>
+              <a:t>Introduction to Operating Systems</a:t>
+            </a:r>
+            <a:endParaRPr lang="en-US" dirty="0"/>
+          </a:p>
+        </p:txBody>
+      </p:sp>
+    </p:spTree>
+    <p:extLst>
+      <p:ext uri="{BB962C8B-B14F-4D97-AF65-F5344CB8AC3E}">
+        <p14:creationId xmlns:p14="http://schemas.microsoft.com/office/powerpoint/2010/main" val="1617771152"/>
+      </p:ext>
+    </p:extLst>
+  </p:cSld>
+  <p:clrMapOvr>
+    <a:masterClrMapping/>
+  </p:clrMapOvr>
+  <p:timing>
+    <p:tnLst>
+      <p:par>
+        <p:cTn id="1" dur="indefinite" restart="never" nodeType="tmRoot"/>
+      </p:par>
+    </p:tnLst>
+  </p:timing>
+</p:sld>
+</file>
+
+<file path=ppt/slides/slide5.xml><?xml version="1.0" encoding="utf-8"?>
+<p:sld xmlns:a="http://schemas.openxmlformats.org/drawingml/2006/main" xmlns:r="http://schemas.openxmlformats.org/officeDocument/2006/relationships" xmlns:p="http://schemas.openxmlformats.org/presentationml/2006/main">
+  <p:cSld>
+    <p:spTree>
+      <p:nvGrpSpPr>
+        <p:cNvPr id="1" name=""/>
+        <p:cNvGrpSpPr/>
+        <p:nvPr/>
+      </p:nvGrpSpPr>
+      <p:grpSpPr>
+        <a:xfrm>
+          <a:off x="0" y="0"/>
+          <a:ext cx="0" cy="0"/>
+          <a:chOff x="0" y="0"/>
+          <a:chExt cx="0" cy="0"/>
+        </a:xfrm>
+      </p:grpSpPr>
+      <p:sp>
+        <p:nvSpPr>
+          <p:cNvPr id="2" name="Title 1"/>
+          <p:cNvSpPr>
+            <a:spLocks noGrp="1"/>
+          </p:cNvSpPr>
+          <p:nvPr>
+            <p:ph type="title"/>
+          </p:nvPr>
+        </p:nvSpPr>
+        <p:spPr/>
+        <p:txBody>
+          <a:bodyPr/>
+          <a:lstStyle/>
+          <a:p>
+            <a:r>
+              <a:rPr lang="en-US" dirty="0" smtClean="0"/>
+              <a:t>A Simple Example</a:t>
+            </a:r>
+            <a:endParaRPr lang="en-US" dirty="0"/>
+          </a:p>
+        </p:txBody>
+      </p:sp>
+      <p:sp>
+        <p:nvSpPr>
+          <p:cNvPr id="4" name="Footer Placeholder 3"/>
+          <p:cNvSpPr>
+            <a:spLocks noGrp="1"/>
+          </p:cNvSpPr>
+          <p:nvPr>
+            <p:ph type="ftr" sz="quarter" idx="11"/>
+          </p:nvPr>
+        </p:nvSpPr>
+        <p:spPr/>
+        <p:txBody>
+          <a:bodyPr/>
+          <a:lstStyle/>
+          <a:p>
+            <a:r>
+              <a:rPr lang="en-US" smtClean="0"/>
+              <a:t>Introduction to Operating Systems</a:t>
+            </a:r>
+            <a:endParaRPr lang="en-US" dirty="0"/>
+          </a:p>
+        </p:txBody>
+      </p:sp>
+    </p:spTree>
+    <p:extLst>
+      <p:ext uri="{BB962C8B-B14F-4D97-AF65-F5344CB8AC3E}">
+        <p14:creationId xmlns:p14="http://schemas.microsoft.com/office/powerpoint/2010/main" val="589296997"/>
+      </p:ext>
+    </p:extLst>
+  </p:cSld>
+  <p:clrMapOvr>
+    <a:masterClrMapping/>
+  </p:clrMapOvr>
+  <p:timing>
+    <p:tnLst>
+      <p:par>
+        <p:cTn id="1" dur="indefinite" restart="never" nodeType="tmRoot"/>
+      </p:par>
+    </p:tnLst>
+  </p:timing>
+</p:sld>
+</file>
+
+<file path=ppt/slides/slide6.xml><?xml version="1.0" encoding="utf-8"?>
+<p:sld xmlns:a="http://schemas.openxmlformats.org/drawingml/2006/main" xmlns:r="http://schemas.openxmlformats.org/officeDocument/2006/relationships" xmlns:p="http://schemas.openxmlformats.org/presentationml/2006/main">
+  <p:cSld>
+    <p:spTree>
+      <p:nvGrpSpPr>
+        <p:cNvPr id="1" name=""/>
+        <p:cNvGrpSpPr/>
+        <p:nvPr/>
+      </p:nvGrpSpPr>
+      <p:grpSpPr>
+        <a:xfrm>
+          <a:off x="0" y="0"/>
+          <a:ext cx="0" cy="0"/>
+          <a:chOff x="0" y="0"/>
+          <a:chExt cx="0" cy="0"/>
+        </a:xfrm>
+      </p:grpSpPr>
+      <p:sp>
+        <p:nvSpPr>
+          <p:cNvPr id="2" name="Title 1"/>
+          <p:cNvSpPr>
+            <a:spLocks noGrp="1"/>
+          </p:cNvSpPr>
+          <p:nvPr>
+            <p:ph type="title"/>
+          </p:nvPr>
+        </p:nvSpPr>
+        <p:spPr/>
+        <p:txBody>
+          <a:bodyPr/>
+          <a:lstStyle/>
+          <a:p>
+            <a:r>
+              <a:rPr lang="en-US" dirty="0" smtClean="0"/>
+              <a:t>Trying </a:t>
             </a:r>
             <a:r>
               <a:rPr lang="en-US" dirty="0" err="1" smtClean="0"/>
-              <a:t>syscall</a:t>
-            </a:r>
-            <a:r>
-              <a:rPr lang="en-US" dirty="0" smtClean="0"/>
-              <a:t> provider</a:t>
-            </a:r>
-          </a:p>
-          <a:p>
-            <a:r>
-              <a:rPr lang="en-US" dirty="0" smtClean="0"/>
-              <a:t>Count the probes available in the </a:t>
-            </a:r>
-            <a:r>
-              <a:rPr lang="en-US" dirty="0" err="1" smtClean="0"/>
-              <a:t>fbt</a:t>
-            </a:r>
-            <a:r>
-              <a:rPr lang="en-US" dirty="0" smtClean="0"/>
-              <a:t> provider</a:t>
-            </a:r>
-            <a:endParaRPr lang="en-US" dirty="0" smtClean="0"/>
-          </a:p>
-          <a:p>
-            <a:r>
-              <a:rPr lang="en-US" dirty="0" smtClean="0"/>
-              <a:t>Find </a:t>
-            </a:r>
-            <a:r>
-              <a:rPr lang="en-US" dirty="0"/>
-              <a:t>and modify three (3) of the </a:t>
-            </a:r>
-            <a:r>
-              <a:rPr lang="en-US" dirty="0" err="1"/>
               <a:t>DTrace</a:t>
             </a:r>
+            <a:endParaRPr lang="en-US" dirty="0"/>
+          </a:p>
+        </p:txBody>
+      </p:sp>
+      <p:sp>
+        <p:nvSpPr>
+          <p:cNvPr id="3" name="Content Placeholder 2"/>
+          <p:cNvSpPr>
+            <a:spLocks noGrp="1"/>
+          </p:cNvSpPr>
+          <p:nvPr>
+            <p:ph idx="1"/>
+          </p:nvPr>
+        </p:nvSpPr>
+        <p:spPr/>
+        <p:txBody>
+          <a:bodyPr/>
+          <a:lstStyle/>
+          <a:p>
             <a:r>
               <a:rPr lang="en-US" dirty="0"/>
               <a:t> </a:t>
             </a:r>
             <a:r>
               <a:rPr lang="en-US" dirty="0" smtClean="0"/>
-              <a:t>one-liners</a:t>
-            </a:r>
-          </a:p>
-          <a:p>
-            <a:r>
-              <a:rPr lang="en-US" dirty="0" smtClean="0"/>
-              <a:t>List one program that is asking for the time of day.</a:t>
-            </a:r>
-          </a:p>
-          <a:p>
-            <a:r>
-              <a:rPr lang="en-US" dirty="0" smtClean="0"/>
-              <a:t>Show that </a:t>
-            </a:r>
+              <a:t> </a:t>
+            </a:r>
+            <a:r>
+              <a:rPr lang="en-US" dirty="0"/>
+              <a:t>Count system </a:t>
+            </a:r>
+            <a:r>
+              <a:rPr lang="en-US" dirty="0" smtClean="0"/>
+              <a:t>calls</a:t>
+            </a:r>
+          </a:p>
+          <a:p>
+            <a:pPr lvl="1"/>
             <a:r>
               <a:rPr lang="en-US" dirty="0" err="1" smtClean="0"/>
-              <a:t>ntpdate</a:t>
-            </a:r>
-            <a:r>
-              <a:rPr lang="en-US" dirty="0" smtClean="0"/>
-              <a:t> sets the kernel time</a:t>
+              <a:t>dtrace</a:t>
+            </a:r>
+            <a:r>
+              <a:rPr lang="en-US" dirty="0" smtClean="0"/>
+              <a:t> -l </a:t>
+            </a:r>
+            <a:r>
+              <a:rPr lang="en-US" dirty="0"/>
+              <a:t>-P </a:t>
+            </a:r>
+            <a:r>
+              <a:rPr lang="en-US" dirty="0" err="1"/>
+              <a:t>syscall</a:t>
+            </a:r>
+            <a:r>
+              <a:rPr lang="en-US" dirty="0"/>
+              <a:t> | </a:t>
+            </a:r>
+            <a:r>
+              <a:rPr lang="en-US" dirty="0" err="1"/>
+              <a:t>wc</a:t>
+            </a:r>
+            <a:r>
+              <a:rPr lang="en-US" dirty="0"/>
+              <a:t> </a:t>
+            </a:r>
+            <a:r>
+              <a:rPr lang="en-US" dirty="0" smtClean="0"/>
+              <a:t>-l</a:t>
             </a:r>
           </a:p>
           <a:p>
             <a:pPr lvl="1"/>
             <a:r>
+              <a:rPr lang="en-US" dirty="0" smtClean="0"/>
+              <a:t>Is this the true count?</a:t>
+            </a:r>
+          </a:p>
+          <a:p>
+            <a:r>
+              <a:rPr lang="en-US" dirty="0" smtClean="0"/>
+              <a:t>Trace </a:t>
+            </a:r>
+            <a:r>
+              <a:rPr lang="en-US" dirty="0"/>
+              <a:t>the names of files </a:t>
+            </a:r>
+            <a:r>
+              <a:rPr lang="en-US" dirty="0" smtClean="0"/>
+              <a:t>opened</a:t>
+            </a:r>
+          </a:p>
+          <a:p>
+            <a:pPr lvl="1"/>
+            <a:r>
               <a:rPr lang="en-US" dirty="0" err="1" smtClean="0"/>
-              <a:t>ntpdate</a:t>
+              <a:t>dtrace</a:t>
             </a:r>
             <a:r>
               <a:rPr lang="en-US" dirty="0" smtClean="0"/>
               <a:t> </a:t>
             </a:r>
             <a:r>
-              <a:rPr lang="en-US" smtClean="0"/>
-              <a:t>time.apple.com</a:t>
-            </a:r>
-            <a:endParaRPr lang="en-US" dirty="0" smtClean="0"/>
+              <a:rPr lang="en-US" dirty="0"/>
+              <a:t>-n '</a:t>
+            </a:r>
+            <a:r>
+              <a:rPr lang="en-US" dirty="0" err="1"/>
+              <a:t>syscall</a:t>
+            </a:r>
+            <a:r>
+              <a:rPr lang="en-US" dirty="0"/>
+              <a:t>::</a:t>
+            </a:r>
+            <a:r>
+              <a:rPr lang="en-US" dirty="0" err="1" smtClean="0"/>
+              <a:t>open:entry</a:t>
+            </a:r>
+            <a:r>
+              <a:rPr lang="en-US" dirty="0" smtClean="0"/>
+              <a:t> { </a:t>
+            </a:r>
+            <a:r>
+              <a:rPr lang="en-US" dirty="0" err="1"/>
+              <a:t>printf</a:t>
+            </a:r>
+            <a:r>
+              <a:rPr lang="en-US" dirty="0"/>
+              <a:t>("%s", </a:t>
+            </a:r>
+            <a:r>
+              <a:rPr lang="en-US" dirty="0" err="1"/>
+              <a:t>copyinstr</a:t>
+            </a:r>
+            <a:r>
+              <a:rPr lang="en-US" dirty="0"/>
+              <a:t>(arg0)); }'</a:t>
+            </a:r>
           </a:p>
         </p:txBody>
       </p:sp>
@@ -5187,7 +5556,7 @@
           <a:p>
             <a:fld id="{699C44C4-0FAD-8046-A5C4-05AB318FA424}" type="slidenum">
               <a:rPr lang="en-US" smtClean="0"/>
-              <a:t>4</a:t>
+              <a:t>6</a:t>
             </a:fld>
             <a:endParaRPr lang="en-US"/>
           </a:p>
@@ -5196,7 +5565,715 @@
     </p:spTree>
     <p:extLst>
       <p:ext uri="{BB962C8B-B14F-4D97-AF65-F5344CB8AC3E}">
-        <p14:creationId xmlns:p14="http://schemas.microsoft.com/office/powerpoint/2010/main" val="255175042"/>
+        <p14:creationId xmlns:p14="http://schemas.microsoft.com/office/powerpoint/2010/main" val="1899540757"/>
+      </p:ext>
+    </p:extLst>
+  </p:cSld>
+  <p:clrMapOvr>
+    <a:masterClrMapping/>
+  </p:clrMapOvr>
+</p:sld>
+</file>
+
+<file path=ppt/slides/slide7.xml><?xml version="1.0" encoding="utf-8"?>
+<p:sld xmlns:a="http://schemas.openxmlformats.org/drawingml/2006/main" xmlns:r="http://schemas.openxmlformats.org/officeDocument/2006/relationships" xmlns:p="http://schemas.openxmlformats.org/presentationml/2006/main">
+  <p:cSld>
+    <p:spTree>
+      <p:nvGrpSpPr>
+        <p:cNvPr id="1" name=""/>
+        <p:cNvGrpSpPr/>
+        <p:nvPr/>
+      </p:nvGrpSpPr>
+      <p:grpSpPr>
+        <a:xfrm>
+          <a:off x="0" y="0"/>
+          <a:ext cx="0" cy="0"/>
+          <a:chOff x="0" y="0"/>
+          <a:chExt cx="0" cy="0"/>
+        </a:xfrm>
+      </p:grpSpPr>
+      <p:sp>
+        <p:nvSpPr>
+          <p:cNvPr id="2" name="Title 1"/>
+          <p:cNvSpPr>
+            <a:spLocks noGrp="1"/>
+          </p:cNvSpPr>
+          <p:nvPr>
+            <p:ph type="title"/>
+          </p:nvPr>
+        </p:nvSpPr>
+        <p:spPr/>
+        <p:txBody>
+          <a:bodyPr/>
+          <a:lstStyle/>
+          <a:p>
+            <a:r>
+              <a:rPr lang="en-US" dirty="0" err="1" smtClean="0"/>
+              <a:t>DTrace</a:t>
+            </a:r>
+            <a:r>
+              <a:rPr lang="en-US" dirty="0" smtClean="0"/>
+              <a:t> Glossary</a:t>
+            </a:r>
+            <a:endParaRPr lang="en-US" dirty="0"/>
+          </a:p>
+        </p:txBody>
+      </p:sp>
+      <p:sp>
+        <p:nvSpPr>
+          <p:cNvPr id="3" name="Content Placeholder 2"/>
+          <p:cNvSpPr>
+            <a:spLocks noGrp="1"/>
+          </p:cNvSpPr>
+          <p:nvPr>
+            <p:ph idx="1"/>
+          </p:nvPr>
+        </p:nvSpPr>
+        <p:spPr/>
+        <p:txBody>
+          <a:bodyPr/>
+          <a:lstStyle/>
+          <a:p>
+            <a:r>
+              <a:rPr lang="en-US" b="1" dirty="0" smtClean="0"/>
+              <a:t>Probe</a:t>
+            </a:r>
+            <a:r>
+              <a:rPr lang="en-US" dirty="0" smtClean="0"/>
+              <a:t> - A </a:t>
+            </a:r>
+            <a:r>
+              <a:rPr lang="en-US" dirty="0"/>
+              <a:t>way of specifying what to trace</a:t>
+            </a:r>
+          </a:p>
+          <a:p>
+            <a:r>
+              <a:rPr lang="en-US" b="1" dirty="0" smtClean="0"/>
+              <a:t>Provider</a:t>
+            </a:r>
+            <a:r>
+              <a:rPr lang="en-US" dirty="0" smtClean="0"/>
+              <a:t> - </a:t>
+            </a:r>
+            <a:r>
+              <a:rPr lang="en-US" dirty="0" err="1" smtClean="0"/>
+              <a:t>DTrace</a:t>
+            </a:r>
+            <a:r>
+              <a:rPr lang="en-US" dirty="0" smtClean="0"/>
+              <a:t> </a:t>
+            </a:r>
+            <a:r>
+              <a:rPr lang="en-US" dirty="0"/>
+              <a:t>defined module that provides information about something in the system</a:t>
+            </a:r>
+          </a:p>
+          <a:p>
+            <a:r>
+              <a:rPr lang="en-US" b="1" dirty="0" smtClean="0"/>
+              <a:t>Module</a:t>
+            </a:r>
+            <a:r>
+              <a:rPr lang="en-US" dirty="0" smtClean="0"/>
+              <a:t> - A </a:t>
+            </a:r>
+            <a:r>
+              <a:rPr lang="en-US" dirty="0"/>
+              <a:t>software module, such as </a:t>
+            </a:r>
+            <a:r>
+              <a:rPr lang="en-US" dirty="0">
+                <a:latin typeface="Courier New" charset="0"/>
+                <a:ea typeface="Courier New" charset="0"/>
+                <a:cs typeface="Courier New" charset="0"/>
+              </a:rPr>
+              <a:t>kernel</a:t>
+            </a:r>
+          </a:p>
+          <a:p>
+            <a:r>
+              <a:rPr lang="en-US" b="1" dirty="0" smtClean="0"/>
+              <a:t>Function</a:t>
+            </a:r>
+            <a:r>
+              <a:rPr lang="en-US" dirty="0" smtClean="0"/>
+              <a:t> - A </a:t>
+            </a:r>
+            <a:r>
+              <a:rPr lang="en-US" dirty="0"/>
+              <a:t>function in a module, such as </a:t>
+            </a:r>
+            <a:r>
+              <a:rPr lang="en-US" dirty="0" err="1">
+                <a:latin typeface="Courier New" charset="0"/>
+                <a:ea typeface="Courier New" charset="0"/>
+                <a:cs typeface="Courier New" charset="0"/>
+              </a:rPr>
+              <a:t>ether_input</a:t>
+            </a:r>
+            <a:r>
+              <a:rPr lang="en-US" dirty="0">
+                <a:latin typeface="Courier New" charset="0"/>
+                <a:ea typeface="Courier New" charset="0"/>
+                <a:cs typeface="Courier New" charset="0"/>
+              </a:rPr>
+              <a:t> </a:t>
+            </a:r>
+            <a:endParaRPr lang="en-US" dirty="0" smtClean="0">
+              <a:latin typeface="Courier New" charset="0"/>
+              <a:ea typeface="Courier New" charset="0"/>
+              <a:cs typeface="Courier New" charset="0"/>
+            </a:endParaRPr>
+          </a:p>
+          <a:p>
+            <a:r>
+              <a:rPr lang="en-US" b="1" dirty="0" smtClean="0"/>
+              <a:t>Predicate</a:t>
+            </a:r>
+            <a:r>
+              <a:rPr lang="en-US" dirty="0" smtClean="0"/>
+              <a:t> - A </a:t>
+            </a:r>
+            <a:r>
+              <a:rPr lang="en-US" dirty="0"/>
+              <a:t>way of filtering </a:t>
+            </a:r>
+            <a:r>
+              <a:rPr lang="en-US" dirty="0" err="1"/>
+              <a:t>DTrace</a:t>
+            </a:r>
+            <a:r>
+              <a:rPr lang="en-US" dirty="0"/>
+              <a:t> probes</a:t>
+            </a:r>
+          </a:p>
+          <a:p>
+            <a:r>
+              <a:rPr lang="en-US" b="1" dirty="0" smtClean="0"/>
+              <a:t>Action</a:t>
+            </a:r>
+            <a:r>
+              <a:rPr lang="en-US" dirty="0" smtClean="0"/>
+              <a:t> </a:t>
+            </a:r>
+            <a:r>
+              <a:rPr lang="mr-IN" dirty="0" smtClean="0"/>
+              <a:t>–</a:t>
+            </a:r>
+            <a:r>
+              <a:rPr lang="en-US" dirty="0" smtClean="0"/>
+              <a:t> The set </a:t>
+            </a:r>
+            <a:r>
+              <a:rPr lang="en-US" dirty="0"/>
+              <a:t>of D language statements carried out when a probe is matched</a:t>
+            </a:r>
+          </a:p>
+        </p:txBody>
+      </p:sp>
+      <p:sp>
+        <p:nvSpPr>
+          <p:cNvPr id="4" name="Footer Placeholder 3"/>
+          <p:cNvSpPr>
+            <a:spLocks noGrp="1"/>
+          </p:cNvSpPr>
+          <p:nvPr>
+            <p:ph type="ftr" sz="quarter" idx="11"/>
+          </p:nvPr>
+        </p:nvSpPr>
+        <p:spPr/>
+        <p:txBody>
+          <a:bodyPr/>
+          <a:lstStyle/>
+          <a:p>
+            <a:r>
+              <a:rPr lang="en-US" smtClean="0"/>
+              <a:t>Introduction to Operating Systems</a:t>
+            </a:r>
+            <a:endParaRPr lang="en-US" dirty="0"/>
+          </a:p>
+        </p:txBody>
+      </p:sp>
+    </p:spTree>
+    <p:extLst>
+      <p:ext uri="{BB962C8B-B14F-4D97-AF65-F5344CB8AC3E}">
+        <p14:creationId xmlns:p14="http://schemas.microsoft.com/office/powerpoint/2010/main" val="80754634"/>
+      </p:ext>
+    </p:extLst>
+  </p:cSld>
+  <p:clrMapOvr>
+    <a:masterClrMapping/>
+  </p:clrMapOvr>
+  <p:timing>
+    <p:tnLst>
+      <p:par>
+        <p:cTn id="1" dur="indefinite" restart="never" nodeType="tmRoot"/>
+      </p:par>
+    </p:tnLst>
+  </p:timing>
+</p:sld>
+</file>
+
+<file path=ppt/slides/slide8.xml><?xml version="1.0" encoding="utf-8"?>
+<p:sld xmlns:a="http://schemas.openxmlformats.org/drawingml/2006/main" xmlns:r="http://schemas.openxmlformats.org/officeDocument/2006/relationships" xmlns:p="http://schemas.openxmlformats.org/presentationml/2006/main">
+  <p:cSld>
+    <p:spTree>
+      <p:nvGrpSpPr>
+        <p:cNvPr id="1" name=""/>
+        <p:cNvGrpSpPr/>
+        <p:nvPr/>
+      </p:nvGrpSpPr>
+      <p:grpSpPr>
+        <a:xfrm>
+          <a:off x="0" y="0"/>
+          <a:ext cx="0" cy="0"/>
+          <a:chOff x="0" y="0"/>
+          <a:chExt cx="0" cy="0"/>
+        </a:xfrm>
+      </p:grpSpPr>
+      <p:sp>
+        <p:nvSpPr>
+          <p:cNvPr id="2" name="Title 1"/>
+          <p:cNvSpPr>
+            <a:spLocks noGrp="1"/>
+          </p:cNvSpPr>
+          <p:nvPr>
+            <p:ph type="title"/>
+          </p:nvPr>
+        </p:nvSpPr>
+        <p:spPr/>
+        <p:txBody>
+          <a:bodyPr/>
+          <a:lstStyle/>
+          <a:p>
+            <a:r>
+              <a:rPr lang="en-US" dirty="0" smtClean="0"/>
+              <a:t>Providers</a:t>
+            </a:r>
+            <a:endParaRPr lang="en-US" dirty="0"/>
+          </a:p>
+        </p:txBody>
+      </p:sp>
+      <p:sp>
+        <p:nvSpPr>
+          <p:cNvPr id="3" name="Content Placeholder 2"/>
+          <p:cNvSpPr>
+            <a:spLocks noGrp="1"/>
+          </p:cNvSpPr>
+          <p:nvPr>
+            <p:ph idx="1"/>
+          </p:nvPr>
+        </p:nvSpPr>
+        <p:spPr/>
+        <p:txBody>
+          <a:bodyPr>
+            <a:normAutofit fontScale="92500" lnSpcReduction="20000"/>
+          </a:bodyPr>
+          <a:lstStyle/>
+          <a:p>
+            <a:r>
+              <a:rPr lang="en-US" b="1" dirty="0" err="1" smtClean="0"/>
+              <a:t>fbt</a:t>
+            </a:r>
+            <a:r>
+              <a:rPr lang="en-US" dirty="0" smtClean="0"/>
+              <a:t> 		Function </a:t>
+            </a:r>
+            <a:r>
+              <a:rPr lang="en-US" dirty="0"/>
+              <a:t>Boundary Tracing (50413) </a:t>
+            </a:r>
+            <a:endParaRPr lang="en-US" dirty="0" smtClean="0"/>
+          </a:p>
+          <a:p>
+            <a:r>
+              <a:rPr lang="en-US" b="1" dirty="0" err="1" smtClean="0"/>
+              <a:t>syscall</a:t>
+            </a:r>
+            <a:r>
+              <a:rPr lang="en-US" dirty="0" smtClean="0"/>
+              <a:t> 	System </a:t>
+            </a:r>
+            <a:r>
+              <a:rPr lang="en-US" dirty="0"/>
+              <a:t>Calls (2148)</a:t>
+            </a:r>
+          </a:p>
+          <a:p>
+            <a:r>
+              <a:rPr lang="en-US" b="1" dirty="0"/>
+              <a:t>profile</a:t>
+            </a:r>
+            <a:r>
+              <a:rPr lang="en-US" dirty="0"/>
+              <a:t> </a:t>
+            </a:r>
+            <a:r>
+              <a:rPr lang="en-US" dirty="0" smtClean="0"/>
+              <a:t>	Timing </a:t>
+            </a:r>
+            <a:r>
+              <a:rPr lang="en-US" dirty="0"/>
+              <a:t>source</a:t>
+            </a:r>
+          </a:p>
+          <a:p>
+            <a:r>
+              <a:rPr lang="en-US" b="1" dirty="0" smtClean="0"/>
+              <a:t>proc		</a:t>
+            </a:r>
+            <a:r>
+              <a:rPr lang="en-US" dirty="0" smtClean="0"/>
+              <a:t>Process </a:t>
+            </a:r>
+            <a:r>
+              <a:rPr lang="en-US" dirty="0"/>
+              <a:t>Operations</a:t>
+            </a:r>
+          </a:p>
+          <a:p>
+            <a:r>
+              <a:rPr lang="en-US" b="1" dirty="0" err="1"/>
+              <a:t>sched</a:t>
+            </a:r>
+            <a:r>
+              <a:rPr lang="en-US" dirty="0"/>
+              <a:t> </a:t>
+            </a:r>
+            <a:r>
+              <a:rPr lang="en-US" dirty="0" smtClean="0"/>
+              <a:t>		Scheduler</a:t>
+            </a:r>
+          </a:p>
+          <a:p>
+            <a:r>
+              <a:rPr lang="en-US" b="1" dirty="0" err="1" smtClean="0"/>
+              <a:t>io</a:t>
+            </a:r>
+            <a:r>
+              <a:rPr lang="en-US" dirty="0" smtClean="0"/>
+              <a:t> 		I/O </a:t>
+            </a:r>
+            <a:r>
+              <a:rPr lang="en-US" dirty="0"/>
+              <a:t>calls</a:t>
+            </a:r>
+          </a:p>
+          <a:p>
+            <a:r>
+              <a:rPr lang="en-US" b="1" dirty="0" err="1"/>
+              <a:t>ip</a:t>
+            </a:r>
+            <a:r>
+              <a:rPr lang="en-US" dirty="0"/>
+              <a:t> </a:t>
+            </a:r>
+            <a:r>
+              <a:rPr lang="en-US" dirty="0" smtClean="0"/>
+              <a:t>		Internet </a:t>
+            </a:r>
+            <a:r>
+              <a:rPr lang="en-US" dirty="0"/>
+              <a:t>Protocol </a:t>
+            </a:r>
+            <a:endParaRPr lang="en-US" dirty="0" smtClean="0"/>
+          </a:p>
+          <a:p>
+            <a:r>
+              <a:rPr lang="en-US" b="1" dirty="0" err="1" smtClean="0"/>
+              <a:t>udp</a:t>
+            </a:r>
+            <a:r>
+              <a:rPr lang="en-US" dirty="0" smtClean="0"/>
+              <a:t> 		UDP</a:t>
+            </a:r>
+            <a:endParaRPr lang="en-US" dirty="0"/>
+          </a:p>
+          <a:p>
+            <a:r>
+              <a:rPr lang="en-US" b="1" dirty="0" err="1"/>
+              <a:t>tcp</a:t>
+            </a:r>
+            <a:r>
+              <a:rPr lang="en-US" dirty="0"/>
+              <a:t> </a:t>
+            </a:r>
+            <a:r>
+              <a:rPr lang="en-US" dirty="0" smtClean="0"/>
+              <a:t>		TCP</a:t>
+            </a:r>
+            <a:endParaRPr lang="en-US" dirty="0"/>
+          </a:p>
+          <a:p>
+            <a:r>
+              <a:rPr lang="en-US" b="1" dirty="0" err="1"/>
+              <a:t>vfs</a:t>
+            </a:r>
+            <a:r>
+              <a:rPr lang="en-US" dirty="0"/>
+              <a:t> </a:t>
+            </a:r>
+            <a:r>
+              <a:rPr lang="en-US" dirty="0" smtClean="0"/>
+              <a:t>		Filesystem </a:t>
+            </a:r>
+            <a:r>
+              <a:rPr lang="en-US" dirty="0"/>
+              <a:t>Routines</a:t>
+            </a:r>
+          </a:p>
+        </p:txBody>
+      </p:sp>
+      <p:sp>
+        <p:nvSpPr>
+          <p:cNvPr id="4" name="Footer Placeholder 3"/>
+          <p:cNvSpPr>
+            <a:spLocks noGrp="1"/>
+          </p:cNvSpPr>
+          <p:nvPr>
+            <p:ph type="ftr" sz="quarter" idx="11"/>
+          </p:nvPr>
+        </p:nvSpPr>
+        <p:spPr/>
+        <p:txBody>
+          <a:bodyPr/>
+          <a:lstStyle/>
+          <a:p>
+            <a:r>
+              <a:rPr lang="en-US" smtClean="0"/>
+              <a:t>Introduction to Operating Systems</a:t>
+            </a:r>
+            <a:endParaRPr lang="en-US" dirty="0"/>
+          </a:p>
+        </p:txBody>
+      </p:sp>
+    </p:spTree>
+    <p:extLst>
+      <p:ext uri="{BB962C8B-B14F-4D97-AF65-F5344CB8AC3E}">
+        <p14:creationId xmlns:p14="http://schemas.microsoft.com/office/powerpoint/2010/main" val="33468734"/>
+      </p:ext>
+    </p:extLst>
+  </p:cSld>
+  <p:clrMapOvr>
+    <a:masterClrMapping/>
+  </p:clrMapOvr>
+  <p:timing>
+    <p:tnLst>
+      <p:par>
+        <p:cTn id="1" dur="indefinite" restart="never" nodeType="tmRoot"/>
+      </p:par>
+    </p:tnLst>
+  </p:timing>
+</p:sld>
+</file>
+
+<file path=ppt/slides/slide9.xml><?xml version="1.0" encoding="utf-8"?>
+<p:sld xmlns:a="http://schemas.openxmlformats.org/drawingml/2006/main" xmlns:r="http://schemas.openxmlformats.org/officeDocument/2006/relationships" xmlns:p="http://schemas.openxmlformats.org/presentationml/2006/main">
+  <p:cSld>
+    <p:spTree>
+      <p:nvGrpSpPr>
+        <p:cNvPr id="1" name=""/>
+        <p:cNvGrpSpPr/>
+        <p:nvPr/>
+      </p:nvGrpSpPr>
+      <p:grpSpPr>
+        <a:xfrm>
+          <a:off x="0" y="0"/>
+          <a:ext cx="0" cy="0"/>
+          <a:chOff x="0" y="0"/>
+          <a:chExt cx="0" cy="0"/>
+        </a:xfrm>
+      </p:grpSpPr>
+      <p:sp>
+        <p:nvSpPr>
+          <p:cNvPr id="2" name="Title 1"/>
+          <p:cNvSpPr>
+            <a:spLocks noGrp="1"/>
+          </p:cNvSpPr>
+          <p:nvPr>
+            <p:ph type="title"/>
+          </p:nvPr>
+        </p:nvSpPr>
+        <p:spPr/>
+        <p:txBody>
+          <a:bodyPr/>
+          <a:lstStyle/>
+          <a:p>
+            <a:r>
+              <a:rPr lang="en-US" dirty="0" err="1" smtClean="0"/>
+              <a:t>Disecting</a:t>
+            </a:r>
+            <a:r>
+              <a:rPr lang="en-US" dirty="0" smtClean="0"/>
+              <a:t> a Probe</a:t>
+            </a:r>
+            <a:endParaRPr lang="en-US" dirty="0"/>
+          </a:p>
+        </p:txBody>
+      </p:sp>
+      <p:sp>
+        <p:nvSpPr>
+          <p:cNvPr id="3" name="Content Placeholder 2"/>
+          <p:cNvSpPr>
+            <a:spLocks noGrp="1"/>
+          </p:cNvSpPr>
+          <p:nvPr>
+            <p:ph idx="1"/>
+          </p:nvPr>
+        </p:nvSpPr>
+        <p:spPr/>
+        <p:txBody>
+          <a:bodyPr>
+            <a:normAutofit/>
+          </a:bodyPr>
+          <a:lstStyle/>
+          <a:p>
+            <a:r>
+              <a:rPr lang="en-US" dirty="0" err="1" smtClean="0"/>
+              <a:t>syscall</a:t>
+            </a:r>
+            <a:r>
+              <a:rPr lang="en-US" dirty="0"/>
+              <a:t>::</a:t>
+            </a:r>
+            <a:r>
+              <a:rPr lang="en-US" dirty="0" err="1"/>
+              <a:t>write:entry</a:t>
+            </a:r>
+            <a:r>
+              <a:rPr lang="en-US" dirty="0"/>
+              <a:t> </a:t>
+            </a:r>
+            <a:endParaRPr lang="en-US" dirty="0" smtClean="0"/>
+          </a:p>
+          <a:p>
+            <a:pPr lvl="1"/>
+            <a:r>
+              <a:rPr lang="en-US" dirty="0" smtClean="0"/>
+              <a:t>Provider </a:t>
+            </a:r>
+            <a:r>
+              <a:rPr lang="en-US" dirty="0" err="1"/>
+              <a:t>syscall</a:t>
+            </a:r>
+            <a:endParaRPr lang="en-US" dirty="0"/>
+          </a:p>
+          <a:p>
+            <a:pPr lvl="1"/>
+            <a:r>
+              <a:rPr lang="en-US" dirty="0"/>
+              <a:t>Module None </a:t>
+            </a:r>
+            <a:endParaRPr lang="en-US" dirty="0" smtClean="0"/>
+          </a:p>
+          <a:p>
+            <a:pPr lvl="1"/>
+            <a:r>
+              <a:rPr lang="en-US" dirty="0" smtClean="0"/>
+              <a:t>Function </a:t>
+            </a:r>
+            <a:r>
+              <a:rPr lang="en-US" dirty="0"/>
+              <a:t>write </a:t>
+            </a:r>
+            <a:endParaRPr lang="en-US" dirty="0" smtClean="0"/>
+          </a:p>
+          <a:p>
+            <a:pPr lvl="1"/>
+            <a:r>
+              <a:rPr lang="en-US" dirty="0" smtClean="0"/>
+              <a:t>Name </a:t>
+            </a:r>
+            <a:r>
+              <a:rPr lang="en-US" dirty="0"/>
+              <a:t>entry</a:t>
+            </a:r>
+          </a:p>
+          <a:p>
+            <a:r>
+              <a:rPr lang="en-US" dirty="0" err="1" smtClean="0"/>
+              <a:t>fbt:kernel:ether_input:entry</a:t>
+            </a:r>
+            <a:r>
+              <a:rPr lang="en-US" dirty="0" smtClean="0"/>
+              <a:t> </a:t>
+            </a:r>
+          </a:p>
+          <a:p>
+            <a:pPr lvl="1"/>
+            <a:r>
+              <a:rPr lang="en-US" dirty="0" smtClean="0"/>
+              <a:t>Provider </a:t>
+            </a:r>
+            <a:r>
+              <a:rPr lang="en-US" dirty="0" err="1"/>
+              <a:t>fbt</a:t>
+            </a:r>
+            <a:endParaRPr lang="en-US" dirty="0"/>
+          </a:p>
+          <a:p>
+            <a:pPr lvl="1"/>
+            <a:r>
+              <a:rPr lang="en-US" dirty="0"/>
+              <a:t>Module kernel </a:t>
+            </a:r>
+            <a:endParaRPr lang="en-US" dirty="0" smtClean="0"/>
+          </a:p>
+          <a:p>
+            <a:pPr lvl="1"/>
+            <a:r>
+              <a:rPr lang="en-US" dirty="0" smtClean="0"/>
+              <a:t>Function </a:t>
+            </a:r>
+            <a:r>
+              <a:rPr lang="en-US" dirty="0" err="1"/>
+              <a:t>ether_input</a:t>
+            </a:r>
+            <a:endParaRPr lang="en-US" dirty="0"/>
+          </a:p>
+          <a:p>
+            <a:pPr lvl="1"/>
+            <a:r>
+              <a:rPr lang="en-US" dirty="0"/>
+              <a:t>Name entry</a:t>
+            </a:r>
+          </a:p>
+          <a:p>
+            <a:endParaRPr lang="en-US" dirty="0" smtClean="0"/>
+          </a:p>
+          <a:p>
+            <a:endParaRPr lang="en-US" dirty="0"/>
+          </a:p>
+        </p:txBody>
+      </p:sp>
+      <p:sp>
+        <p:nvSpPr>
+          <p:cNvPr id="4" name="Footer Placeholder 3"/>
+          <p:cNvSpPr>
+            <a:spLocks noGrp="1"/>
+          </p:cNvSpPr>
+          <p:nvPr>
+            <p:ph type="ftr" sz="quarter" idx="11"/>
+          </p:nvPr>
+        </p:nvSpPr>
+        <p:spPr/>
+        <p:txBody>
+          <a:bodyPr/>
+          <a:lstStyle/>
+          <a:p>
+            <a:r>
+              <a:rPr lang="en-US" smtClean="0"/>
+              <a:t>Introduction to Operating Systems</a:t>
+            </a:r>
+            <a:endParaRPr lang="en-US" dirty="0"/>
+          </a:p>
+        </p:txBody>
+      </p:sp>
+    </p:spTree>
+    <p:extLst>
+      <p:ext uri="{BB962C8B-B14F-4D97-AF65-F5344CB8AC3E}">
+        <p14:creationId xmlns:p14="http://schemas.microsoft.com/office/powerpoint/2010/main" val="2015780471"/>
       </p:ext>
     </p:extLst>
   </p:cSld>

</xml_diff>